<commit_message>
KS test and distributions plots
</commit_message>
<xml_diff>
--- a/Figs/circuit_diagrams.pptx
+++ b/Figs/circuit_diagrams.pptx
@@ -5,10 +5,11 @@
     <p:sldMasterId id="2147483648" r:id="rId1"/>
   </p:sldMasterIdLst>
   <p:notesMasterIdLst>
-    <p:notesMasterId r:id="rId3"/>
+    <p:notesMasterId r:id="rId4"/>
   </p:notesMasterIdLst>
   <p:sldIdLst>
     <p:sldId id="260" r:id="rId2"/>
+    <p:sldId id="261" r:id="rId3"/>
   </p:sldIdLst>
   <p:sldSz cx="12192000" cy="6858000"/>
   <p:notesSz cx="6858000" cy="9144000"/>
@@ -118,7 +119,7 @@
 <file path=ppt/revisionInfo.xml><?xml version="1.0" encoding="utf-8"?>
 <p1510:revInfo xmlns:a="http://schemas.openxmlformats.org/drawingml/2006/main" xmlns:r="http://schemas.openxmlformats.org/officeDocument/2006/relationships" xmlns:p1510="http://schemas.microsoft.com/office/powerpoint/2015/10/main">
   <p1510:revLst>
-    <p1510:client id="{EE02F971-86F5-428E-BC14-A8CDA14DE2B7}" v="33" dt="2023-10-12T13:26:47.986"/>
+    <p1510:client id="{EE02F971-86F5-428E-BC14-A8CDA14DE2B7}" v="60" dt="2023-10-25T07:16:17.430"/>
   </p1510:revLst>
 </p1510:revInfo>
 </file>
@@ -4511,8 +4512,8 @@
   </pc:docChgLst>
   <pc:docChgLst>
     <pc:chgData name="Johann Bock Severin" userId="3b36179260fc8001" providerId="LiveId" clId="{EE02F971-86F5-428E-BC14-A8CDA14DE2B7}"/>
-    <pc:docChg chg="undo custSel delSld modSld delSection modSection">
-      <pc:chgData name="Johann Bock Severin" userId="3b36179260fc8001" providerId="LiveId" clId="{EE02F971-86F5-428E-BC14-A8CDA14DE2B7}" dt="2023-10-12T13:26:47.986" v="70" actId="20577"/>
+    <pc:docChg chg="undo custSel addSld delSld modSld delSection modSection">
+      <pc:chgData name="Johann Bock Severin" userId="3b36179260fc8001" providerId="LiveId" clId="{EE02F971-86F5-428E-BC14-A8CDA14DE2B7}" dt="2023-10-25T07:16:44.191" v="327" actId="1076"/>
       <pc:docMkLst>
         <pc:docMk/>
       </pc:docMkLst>
@@ -4926,6 +4927,461 @@
           <pc:docMk/>
           <pc:sldMk cId="1036491775" sldId="261"/>
         </pc:sldMkLst>
+      </pc:sldChg>
+      <pc:sldChg chg="addSp delSp modSp add mod">
+        <pc:chgData name="Johann Bock Severin" userId="3b36179260fc8001" providerId="LiveId" clId="{EE02F971-86F5-428E-BC14-A8CDA14DE2B7}" dt="2023-10-25T07:16:44.191" v="327" actId="1076"/>
+        <pc:sldMkLst>
+          <pc:docMk/>
+          <pc:sldMk cId="3173105583" sldId="261"/>
+        </pc:sldMkLst>
+        <pc:spChg chg="add mod topLvl">
+          <ac:chgData name="Johann Bock Severin" userId="3b36179260fc8001" providerId="LiveId" clId="{EE02F971-86F5-428E-BC14-A8CDA14DE2B7}" dt="2023-10-25T07:14:39.667" v="296" actId="207"/>
+          <ac:spMkLst>
+            <pc:docMk/>
+            <pc:sldMk cId="3173105583" sldId="261"/>
+            <ac:spMk id="2" creationId="{5EF86225-4E04-4E4E-CD82-DF84FBE8C747}"/>
+          </ac:spMkLst>
+        </pc:spChg>
+        <pc:spChg chg="del">
+          <ac:chgData name="Johann Bock Severin" userId="3b36179260fc8001" providerId="LiveId" clId="{EE02F971-86F5-428E-BC14-A8CDA14DE2B7}" dt="2023-10-25T07:04:29.105" v="98" actId="478"/>
+          <ac:spMkLst>
+            <pc:docMk/>
+            <pc:sldMk cId="3173105583" sldId="261"/>
+            <ac:spMk id="3" creationId="{518BCE2B-DC1A-C07B-A697-CD9F8D1B8CFA}"/>
+          </ac:spMkLst>
+        </pc:spChg>
+        <pc:spChg chg="add mod topLvl">
+          <ac:chgData name="Johann Bock Severin" userId="3b36179260fc8001" providerId="LiveId" clId="{EE02F971-86F5-428E-BC14-A8CDA14DE2B7}" dt="2023-10-25T07:14:37.388" v="295" actId="207"/>
+          <ac:spMkLst>
+            <pc:docMk/>
+            <pc:sldMk cId="3173105583" sldId="261"/>
+            <ac:spMk id="5" creationId="{B2A3E9D7-DC25-C9D7-1951-0B87BBDE781D}"/>
+          </ac:spMkLst>
+        </pc:spChg>
+        <pc:spChg chg="del">
+          <ac:chgData name="Johann Bock Severin" userId="3b36179260fc8001" providerId="LiveId" clId="{EE02F971-86F5-428E-BC14-A8CDA14DE2B7}" dt="2023-10-25T07:04:29.105" v="98" actId="478"/>
+          <ac:spMkLst>
+            <pc:docMk/>
+            <pc:sldMk cId="3173105583" sldId="261"/>
+            <ac:spMk id="12" creationId="{F217EFA6-9729-D04F-9C0F-DFC38083C799}"/>
+          </ac:spMkLst>
+        </pc:spChg>
+        <pc:spChg chg="del">
+          <ac:chgData name="Johann Bock Severin" userId="3b36179260fc8001" providerId="LiveId" clId="{EE02F971-86F5-428E-BC14-A8CDA14DE2B7}" dt="2023-10-25T07:04:29.105" v="98" actId="478"/>
+          <ac:spMkLst>
+            <pc:docMk/>
+            <pc:sldMk cId="3173105583" sldId="261"/>
+            <ac:spMk id="13" creationId="{9C979844-9816-0C24-1F2E-64C12970934F}"/>
+          </ac:spMkLst>
+        </pc:spChg>
+        <pc:spChg chg="add mod">
+          <ac:chgData name="Johann Bock Severin" userId="3b36179260fc8001" providerId="LiveId" clId="{EE02F971-86F5-428E-BC14-A8CDA14DE2B7}" dt="2023-10-25T07:15:03.748" v="316" actId="1076"/>
+          <ac:spMkLst>
+            <pc:docMk/>
+            <pc:sldMk cId="3173105583" sldId="261"/>
+            <ac:spMk id="22" creationId="{D0721B8C-EC7D-4E9E-DD95-638F89F64F0D}"/>
+          </ac:spMkLst>
+        </pc:spChg>
+        <pc:spChg chg="add mod">
+          <ac:chgData name="Johann Bock Severin" userId="3b36179260fc8001" providerId="LiveId" clId="{EE02F971-86F5-428E-BC14-A8CDA14DE2B7}" dt="2023-10-25T07:06:19.405" v="176" actId="571"/>
+          <ac:spMkLst>
+            <pc:docMk/>
+            <pc:sldMk cId="3173105583" sldId="261"/>
+            <ac:spMk id="23" creationId="{3B86B5C1-C63D-7957-9B0C-D7C65C579935}"/>
+          </ac:spMkLst>
+        </pc:spChg>
+        <pc:spChg chg="add mod">
+          <ac:chgData name="Johann Bock Severin" userId="3b36179260fc8001" providerId="LiveId" clId="{EE02F971-86F5-428E-BC14-A8CDA14DE2B7}" dt="2023-10-25T07:06:09.882" v="166" actId="571"/>
+          <ac:spMkLst>
+            <pc:docMk/>
+            <pc:sldMk cId="3173105583" sldId="261"/>
+            <ac:spMk id="24" creationId="{37E8A863-3706-D067-9C9F-890A1FDE9CB2}"/>
+          </ac:spMkLst>
+        </pc:spChg>
+        <pc:spChg chg="del">
+          <ac:chgData name="Johann Bock Severin" userId="3b36179260fc8001" providerId="LiveId" clId="{EE02F971-86F5-428E-BC14-A8CDA14DE2B7}" dt="2023-10-25T07:03:24.310" v="72" actId="478"/>
+          <ac:spMkLst>
+            <pc:docMk/>
+            <pc:sldMk cId="3173105583" sldId="261"/>
+            <ac:spMk id="25" creationId="{5C026F19-6499-9D9A-74FD-900128C35E91}"/>
+          </ac:spMkLst>
+        </pc:spChg>
+        <pc:spChg chg="del">
+          <ac:chgData name="Johann Bock Severin" userId="3b36179260fc8001" providerId="LiveId" clId="{EE02F971-86F5-428E-BC14-A8CDA14DE2B7}" dt="2023-10-25T07:03:24.310" v="72" actId="478"/>
+          <ac:spMkLst>
+            <pc:docMk/>
+            <pc:sldMk cId="3173105583" sldId="261"/>
+            <ac:spMk id="28" creationId="{34A23BE5-BB45-AB13-4F45-8D3E7E980432}"/>
+          </ac:spMkLst>
+        </pc:spChg>
+        <pc:spChg chg="add mod topLvl">
+          <ac:chgData name="Johann Bock Severin" userId="3b36179260fc8001" providerId="LiveId" clId="{EE02F971-86F5-428E-BC14-A8CDA14DE2B7}" dt="2023-10-25T07:13:58.629" v="288" actId="165"/>
+          <ac:spMkLst>
+            <pc:docMk/>
+            <pc:sldMk cId="3173105583" sldId="261"/>
+            <ac:spMk id="29" creationId="{9F6986DC-0E7A-0087-A9A1-BEC73335CC22}"/>
+          </ac:spMkLst>
+        </pc:spChg>
+        <pc:spChg chg="del">
+          <ac:chgData name="Johann Bock Severin" userId="3b36179260fc8001" providerId="LiveId" clId="{EE02F971-86F5-428E-BC14-A8CDA14DE2B7}" dt="2023-10-25T07:03:24.310" v="72" actId="478"/>
+          <ac:spMkLst>
+            <pc:docMk/>
+            <pc:sldMk cId="3173105583" sldId="261"/>
+            <ac:spMk id="34" creationId="{3601E909-2698-F9A6-63CB-66ABA1420DBD}"/>
+          </ac:spMkLst>
+        </pc:spChg>
+        <pc:spChg chg="del">
+          <ac:chgData name="Johann Bock Severin" userId="3b36179260fc8001" providerId="LiveId" clId="{EE02F971-86F5-428E-BC14-A8CDA14DE2B7}" dt="2023-10-25T07:03:24.310" v="72" actId="478"/>
+          <ac:spMkLst>
+            <pc:docMk/>
+            <pc:sldMk cId="3173105583" sldId="261"/>
+            <ac:spMk id="35" creationId="{B9BD7E56-8628-888C-A6C9-9C2F8889ED8D}"/>
+          </ac:spMkLst>
+        </pc:spChg>
+        <pc:spChg chg="del">
+          <ac:chgData name="Johann Bock Severin" userId="3b36179260fc8001" providerId="LiveId" clId="{EE02F971-86F5-428E-BC14-A8CDA14DE2B7}" dt="2023-10-25T07:04:29.105" v="98" actId="478"/>
+          <ac:spMkLst>
+            <pc:docMk/>
+            <pc:sldMk cId="3173105583" sldId="261"/>
+            <ac:spMk id="36" creationId="{6FBFAC53-773F-F558-2B93-E8D7616F5A7D}"/>
+          </ac:spMkLst>
+        </pc:spChg>
+        <pc:spChg chg="del">
+          <ac:chgData name="Johann Bock Severin" userId="3b36179260fc8001" providerId="LiveId" clId="{EE02F971-86F5-428E-BC14-A8CDA14DE2B7}" dt="2023-10-25T07:04:30.889" v="99" actId="478"/>
+          <ac:spMkLst>
+            <pc:docMk/>
+            <pc:sldMk cId="3173105583" sldId="261"/>
+            <ac:spMk id="37" creationId="{67D75CDB-CD52-2D49-13B9-751815C55011}"/>
+          </ac:spMkLst>
+        </pc:spChg>
+        <pc:spChg chg="add mod topLvl">
+          <ac:chgData name="Johann Bock Severin" userId="3b36179260fc8001" providerId="LiveId" clId="{EE02F971-86F5-428E-BC14-A8CDA14DE2B7}" dt="2023-10-25T07:13:58.629" v="288" actId="165"/>
+          <ac:spMkLst>
+            <pc:docMk/>
+            <pc:sldMk cId="3173105583" sldId="261"/>
+            <ac:spMk id="39" creationId="{3752E311-7594-CFE0-99BB-7DC73D818C3B}"/>
+          </ac:spMkLst>
+        </pc:spChg>
+        <pc:spChg chg="add del">
+          <ac:chgData name="Johann Bock Severin" userId="3b36179260fc8001" providerId="LiveId" clId="{EE02F971-86F5-428E-BC14-A8CDA14DE2B7}" dt="2023-10-25T07:07:40.677" v="213" actId="11529"/>
+          <ac:spMkLst>
+            <pc:docMk/>
+            <pc:sldMk cId="3173105583" sldId="261"/>
+            <ac:spMk id="42" creationId="{F90F859B-4A80-24F1-27E4-3E96D7E1655D}"/>
+          </ac:spMkLst>
+        </pc:spChg>
+        <pc:spChg chg="add del">
+          <ac:chgData name="Johann Bock Severin" userId="3b36179260fc8001" providerId="LiveId" clId="{EE02F971-86F5-428E-BC14-A8CDA14DE2B7}" dt="2023-10-25T07:08:04.085" v="217" actId="11529"/>
+          <ac:spMkLst>
+            <pc:docMk/>
+            <pc:sldMk cId="3173105583" sldId="261"/>
+            <ac:spMk id="45" creationId="{5AB86B52-5E61-34E9-CDCA-9F8658BC01BB}"/>
+          </ac:spMkLst>
+        </pc:spChg>
+        <pc:spChg chg="add del">
+          <ac:chgData name="Johann Bock Severin" userId="3b36179260fc8001" providerId="LiveId" clId="{EE02F971-86F5-428E-BC14-A8CDA14DE2B7}" dt="2023-10-25T07:08:16.526" v="219" actId="478"/>
+          <ac:spMkLst>
+            <pc:docMk/>
+            <pc:sldMk cId="3173105583" sldId="261"/>
+            <ac:spMk id="46" creationId="{65A3A9C6-114D-6830-F692-21E33705480F}"/>
+          </ac:spMkLst>
+        </pc:spChg>
+        <pc:spChg chg="add del">
+          <ac:chgData name="Johann Bock Severin" userId="3b36179260fc8001" providerId="LiveId" clId="{EE02F971-86F5-428E-BC14-A8CDA14DE2B7}" dt="2023-10-25T07:08:38.604" v="221" actId="478"/>
+          <ac:spMkLst>
+            <pc:docMk/>
+            <pc:sldMk cId="3173105583" sldId="261"/>
+            <ac:spMk id="47" creationId="{9AE3A901-F5E3-DB15-32F1-FD6AE18B8E76}"/>
+          </ac:spMkLst>
+        </pc:spChg>
+        <pc:spChg chg="add del">
+          <ac:chgData name="Johann Bock Severin" userId="3b36179260fc8001" providerId="LiveId" clId="{EE02F971-86F5-428E-BC14-A8CDA14DE2B7}" dt="2023-10-25T07:09:21.790" v="243" actId="478"/>
+          <ac:spMkLst>
+            <pc:docMk/>
+            <pc:sldMk cId="3173105583" sldId="261"/>
+            <ac:spMk id="51" creationId="{434E94A7-20E2-CBBB-AEB9-ADD394A9ECAA}"/>
+          </ac:spMkLst>
+        </pc:spChg>
+        <pc:spChg chg="add del">
+          <ac:chgData name="Johann Bock Severin" userId="3b36179260fc8001" providerId="LiveId" clId="{EE02F971-86F5-428E-BC14-A8CDA14DE2B7}" dt="2023-10-25T07:09:39.380" v="245" actId="478"/>
+          <ac:spMkLst>
+            <pc:docMk/>
+            <pc:sldMk cId="3173105583" sldId="261"/>
+            <ac:spMk id="52" creationId="{D21241AE-B530-47A4-3C68-DC775358C0E2}"/>
+          </ac:spMkLst>
+        </pc:spChg>
+        <pc:spChg chg="add mod ord topLvl">
+          <ac:chgData name="Johann Bock Severin" userId="3b36179260fc8001" providerId="LiveId" clId="{EE02F971-86F5-428E-BC14-A8CDA14DE2B7}" dt="2023-10-25T07:16:09.181" v="323" actId="11530"/>
+          <ac:spMkLst>
+            <pc:docMk/>
+            <pc:sldMk cId="3173105583" sldId="261"/>
+            <ac:spMk id="53" creationId="{C0BEB1B5-B15D-D442-3378-E280584ABA9D}"/>
+          </ac:spMkLst>
+        </pc:spChg>
+        <pc:spChg chg="add mod ord topLvl">
+          <ac:chgData name="Johann Bock Severin" userId="3b36179260fc8001" providerId="LiveId" clId="{EE02F971-86F5-428E-BC14-A8CDA14DE2B7}" dt="2023-10-25T07:14:58.615" v="315" actId="20577"/>
+          <ac:spMkLst>
+            <pc:docMk/>
+            <pc:sldMk cId="3173105583" sldId="261"/>
+            <ac:spMk id="54" creationId="{1A06878E-7146-7FF7-9E21-486E4BD9A082}"/>
+          </ac:spMkLst>
+        </pc:spChg>
+        <pc:spChg chg="add mod ord">
+          <ac:chgData name="Johann Bock Severin" userId="3b36179260fc8001" providerId="LiveId" clId="{EE02F971-86F5-428E-BC14-A8CDA14DE2B7}" dt="2023-10-25T07:16:44.191" v="327" actId="1076"/>
+          <ac:spMkLst>
+            <pc:docMk/>
+            <pc:sldMk cId="3173105583" sldId="261"/>
+            <ac:spMk id="55" creationId="{F9BDB2CA-83E4-4A46-D204-7719DF0F64D2}"/>
+          </ac:spMkLst>
+        </pc:spChg>
+        <pc:spChg chg="add mod ord topLvl">
+          <ac:chgData name="Johann Bock Severin" userId="3b36179260fc8001" providerId="LiveId" clId="{EE02F971-86F5-428E-BC14-A8CDA14DE2B7}" dt="2023-10-25T07:16:35.496" v="326" actId="167"/>
+          <ac:spMkLst>
+            <pc:docMk/>
+            <pc:sldMk cId="3173105583" sldId="261"/>
+            <ac:spMk id="56" creationId="{C1D4D9A4-6DDE-355F-C146-D54C9B2FB3C9}"/>
+          </ac:spMkLst>
+        </pc:spChg>
+        <pc:spChg chg="add mod ord topLvl">
+          <ac:chgData name="Johann Bock Severin" userId="3b36179260fc8001" providerId="LiveId" clId="{EE02F971-86F5-428E-BC14-A8CDA14DE2B7}" dt="2023-10-25T07:16:35.496" v="326" actId="167"/>
+          <ac:spMkLst>
+            <pc:docMk/>
+            <pc:sldMk cId="3173105583" sldId="261"/>
+            <ac:spMk id="57" creationId="{E346330F-AB5E-2470-08A1-02FD04071A1B}"/>
+          </ac:spMkLst>
+        </pc:spChg>
+        <pc:spChg chg="add mod ord topLvl">
+          <ac:chgData name="Johann Bock Severin" userId="3b36179260fc8001" providerId="LiveId" clId="{EE02F971-86F5-428E-BC14-A8CDA14DE2B7}" dt="2023-10-25T07:16:35.496" v="326" actId="167"/>
+          <ac:spMkLst>
+            <pc:docMk/>
+            <pc:sldMk cId="3173105583" sldId="261"/>
+            <ac:spMk id="58" creationId="{0FA9454D-43BD-2B3B-01E5-F3211E5D5906}"/>
+          </ac:spMkLst>
+        </pc:spChg>
+        <pc:spChg chg="add mod ord topLvl">
+          <ac:chgData name="Johann Bock Severin" userId="3b36179260fc8001" providerId="LiveId" clId="{EE02F971-86F5-428E-BC14-A8CDA14DE2B7}" dt="2023-10-25T07:16:35.496" v="326" actId="167"/>
+          <ac:spMkLst>
+            <pc:docMk/>
+            <pc:sldMk cId="3173105583" sldId="261"/>
+            <ac:spMk id="59" creationId="{3FD39345-4398-2712-0603-439135989AAC}"/>
+          </ac:spMkLst>
+        </pc:spChg>
+        <pc:spChg chg="add mod ord topLvl">
+          <ac:chgData name="Johann Bock Severin" userId="3b36179260fc8001" providerId="LiveId" clId="{EE02F971-86F5-428E-BC14-A8CDA14DE2B7}" dt="2023-10-25T07:16:35.496" v="326" actId="167"/>
+          <ac:spMkLst>
+            <pc:docMk/>
+            <pc:sldMk cId="3173105583" sldId="261"/>
+            <ac:spMk id="60" creationId="{C3BC3275-DC34-ED66-7695-AD40AAF39854}"/>
+          </ac:spMkLst>
+        </pc:spChg>
+        <pc:spChg chg="del">
+          <ac:chgData name="Johann Bock Severin" userId="3b36179260fc8001" providerId="LiveId" clId="{EE02F971-86F5-428E-BC14-A8CDA14DE2B7}" dt="2023-10-25T07:03:24.310" v="72" actId="478"/>
+          <ac:spMkLst>
+            <pc:docMk/>
+            <pc:sldMk cId="3173105583" sldId="261"/>
+            <ac:spMk id="62" creationId="{06FC1A69-B502-EE8D-8F71-28BF09E50F98}"/>
+          </ac:spMkLst>
+        </pc:spChg>
+        <pc:spChg chg="del">
+          <ac:chgData name="Johann Bock Severin" userId="3b36179260fc8001" providerId="LiveId" clId="{EE02F971-86F5-428E-BC14-A8CDA14DE2B7}" dt="2023-10-25T07:03:24.310" v="72" actId="478"/>
+          <ac:spMkLst>
+            <pc:docMk/>
+            <pc:sldMk cId="3173105583" sldId="261"/>
+            <ac:spMk id="63" creationId="{E4F97A73-2630-A383-36FE-1427D3242DFB}"/>
+          </ac:spMkLst>
+        </pc:spChg>
+        <pc:spChg chg="del">
+          <ac:chgData name="Johann Bock Severin" userId="3b36179260fc8001" providerId="LiveId" clId="{EE02F971-86F5-428E-BC14-A8CDA14DE2B7}" dt="2023-10-25T07:03:24.310" v="72" actId="478"/>
+          <ac:spMkLst>
+            <pc:docMk/>
+            <pc:sldMk cId="3173105583" sldId="261"/>
+            <ac:spMk id="64" creationId="{9607E7CF-5DA4-96D3-5042-1BE3DF692B01}"/>
+          </ac:spMkLst>
+        </pc:spChg>
+        <pc:spChg chg="del">
+          <ac:chgData name="Johann Bock Severin" userId="3b36179260fc8001" providerId="LiveId" clId="{EE02F971-86F5-428E-BC14-A8CDA14DE2B7}" dt="2023-10-25T07:03:24.310" v="72" actId="478"/>
+          <ac:spMkLst>
+            <pc:docMk/>
+            <pc:sldMk cId="3173105583" sldId="261"/>
+            <ac:spMk id="66" creationId="{21DF2710-2D08-FD43-9AC8-D62428E22FD7}"/>
+          </ac:spMkLst>
+        </pc:spChg>
+        <pc:grpChg chg="del">
+          <ac:chgData name="Johann Bock Severin" userId="3b36179260fc8001" providerId="LiveId" clId="{EE02F971-86F5-428E-BC14-A8CDA14DE2B7}" dt="2023-10-25T07:04:29.105" v="98" actId="478"/>
+          <ac:grpSpMkLst>
+            <pc:docMk/>
+            <pc:sldMk cId="3173105583" sldId="261"/>
+            <ac:grpSpMk id="21" creationId="{EBA5FD95-E8FB-3B44-69DF-40568E795712}"/>
+          </ac:grpSpMkLst>
+        </pc:grpChg>
+        <pc:grpChg chg="del">
+          <ac:chgData name="Johann Bock Severin" userId="3b36179260fc8001" providerId="LiveId" clId="{EE02F971-86F5-428E-BC14-A8CDA14DE2B7}" dt="2023-10-25T07:03:24.310" v="72" actId="478"/>
+          <ac:grpSpMkLst>
+            <pc:docMk/>
+            <pc:sldMk cId="3173105583" sldId="261"/>
+            <ac:grpSpMk id="30" creationId="{A2A86FA0-8D15-440C-B804-4A136489EA7E}"/>
+          </ac:grpSpMkLst>
+        </pc:grpChg>
+        <pc:grpChg chg="add del mod">
+          <ac:chgData name="Johann Bock Severin" userId="3b36179260fc8001" providerId="LiveId" clId="{EE02F971-86F5-428E-BC14-A8CDA14DE2B7}" dt="2023-10-25T07:13:58.629" v="288" actId="165"/>
+          <ac:grpSpMkLst>
+            <pc:docMk/>
+            <pc:sldMk cId="3173105583" sldId="261"/>
+            <ac:grpSpMk id="61" creationId="{8BEB6DB2-A1C7-60F4-650E-B7ED707636D9}"/>
+          </ac:grpSpMkLst>
+        </pc:grpChg>
+        <pc:cxnChg chg="del mod">
+          <ac:chgData name="Johann Bock Severin" userId="3b36179260fc8001" providerId="LiveId" clId="{EE02F971-86F5-428E-BC14-A8CDA14DE2B7}" dt="2023-10-25T07:04:29.105" v="98" actId="478"/>
+          <ac:cxnSpMkLst>
+            <pc:docMk/>
+            <pc:sldMk cId="3173105583" sldId="261"/>
+            <ac:cxnSpMk id="4" creationId="{0DB4F051-F993-DA8B-D5C3-65C46AB39822}"/>
+          </ac:cxnSpMkLst>
+        </pc:cxnChg>
+        <pc:cxnChg chg="add mod ord topLvl">
+          <ac:chgData name="Johann Bock Severin" userId="3b36179260fc8001" providerId="LiveId" clId="{EE02F971-86F5-428E-BC14-A8CDA14DE2B7}" dt="2023-10-25T07:13:58.629" v="288" actId="165"/>
+          <ac:cxnSpMkLst>
+            <pc:docMk/>
+            <pc:sldMk cId="3173105583" sldId="261"/>
+            <ac:cxnSpMk id="7" creationId="{1B71BCC7-9052-4F74-A912-CF3D282CE2AB}"/>
+          </ac:cxnSpMkLst>
+        </pc:cxnChg>
+        <pc:cxnChg chg="add mod ord topLvl">
+          <ac:chgData name="Johann Bock Severin" userId="3b36179260fc8001" providerId="LiveId" clId="{EE02F971-86F5-428E-BC14-A8CDA14DE2B7}" dt="2023-10-25T07:13:58.629" v="288" actId="165"/>
+          <ac:cxnSpMkLst>
+            <pc:docMk/>
+            <pc:sldMk cId="3173105583" sldId="261"/>
+            <ac:cxnSpMk id="8" creationId="{A9190892-E86C-11B3-D082-4A38D46B3825}"/>
+          </ac:cxnSpMkLst>
+        </pc:cxnChg>
+        <pc:cxnChg chg="del">
+          <ac:chgData name="Johann Bock Severin" userId="3b36179260fc8001" providerId="LiveId" clId="{EE02F971-86F5-428E-BC14-A8CDA14DE2B7}" dt="2023-10-25T07:04:29.105" v="98" actId="478"/>
+          <ac:cxnSpMkLst>
+            <pc:docMk/>
+            <pc:sldMk cId="3173105583" sldId="261"/>
+            <ac:cxnSpMk id="9" creationId="{52FCE10B-5C22-4207-4CA8-155C94710450}"/>
+          </ac:cxnSpMkLst>
+        </pc:cxnChg>
+        <pc:cxnChg chg="add del mod ord">
+          <ac:chgData name="Johann Bock Severin" userId="3b36179260fc8001" providerId="LiveId" clId="{EE02F971-86F5-428E-BC14-A8CDA14DE2B7}" dt="2023-10-25T07:06:42.312" v="185" actId="478"/>
+          <ac:cxnSpMkLst>
+            <pc:docMk/>
+            <pc:sldMk cId="3173105583" sldId="261"/>
+            <ac:cxnSpMk id="10" creationId="{7B17C900-15EF-42C2-10EB-E9A140D831AC}"/>
+          </ac:cxnSpMkLst>
+        </pc:cxnChg>
+        <pc:cxnChg chg="del">
+          <ac:chgData name="Johann Bock Severin" userId="3b36179260fc8001" providerId="LiveId" clId="{EE02F971-86F5-428E-BC14-A8CDA14DE2B7}" dt="2023-10-25T07:04:29.105" v="98" actId="478"/>
+          <ac:cxnSpMkLst>
+            <pc:docMk/>
+            <pc:sldMk cId="3173105583" sldId="261"/>
+            <ac:cxnSpMk id="11" creationId="{E306E4C2-BEC6-17CA-2874-DA459E494760}"/>
+          </ac:cxnSpMkLst>
+        </pc:cxnChg>
+        <pc:cxnChg chg="del">
+          <ac:chgData name="Johann Bock Severin" userId="3b36179260fc8001" providerId="LiveId" clId="{EE02F971-86F5-428E-BC14-A8CDA14DE2B7}" dt="2023-10-25T07:04:29.105" v="98" actId="478"/>
+          <ac:cxnSpMkLst>
+            <pc:docMk/>
+            <pc:sldMk cId="3173105583" sldId="261"/>
+            <ac:cxnSpMk id="15" creationId="{4E800688-6EF7-C483-A5A9-21F088388A1D}"/>
+          </ac:cxnSpMkLst>
+        </pc:cxnChg>
+        <pc:cxnChg chg="del">
+          <ac:chgData name="Johann Bock Severin" userId="3b36179260fc8001" providerId="LiveId" clId="{EE02F971-86F5-428E-BC14-A8CDA14DE2B7}" dt="2023-10-25T07:04:29.105" v="98" actId="478"/>
+          <ac:cxnSpMkLst>
+            <pc:docMk/>
+            <pc:sldMk cId="3173105583" sldId="261"/>
+            <ac:cxnSpMk id="16" creationId="{95600A1E-DD0F-F93F-0183-8385E7CE23AE}"/>
+          </ac:cxnSpMkLst>
+        </pc:cxnChg>
+        <pc:cxnChg chg="add mod">
+          <ac:chgData name="Johann Bock Severin" userId="3b36179260fc8001" providerId="LiveId" clId="{EE02F971-86F5-428E-BC14-A8CDA14DE2B7}" dt="2023-10-25T07:05:08.020" v="117" actId="571"/>
+          <ac:cxnSpMkLst>
+            <pc:docMk/>
+            <pc:sldMk cId="3173105583" sldId="261"/>
+            <ac:cxnSpMk id="17" creationId="{8B999D9E-52BA-21BB-17E5-35AC695AFB89}"/>
+          </ac:cxnSpMkLst>
+        </pc:cxnChg>
+        <pc:cxnChg chg="add mod">
+          <ac:chgData name="Johann Bock Severin" userId="3b36179260fc8001" providerId="LiveId" clId="{EE02F971-86F5-428E-BC14-A8CDA14DE2B7}" dt="2023-10-25T07:05:08.020" v="117" actId="571"/>
+          <ac:cxnSpMkLst>
+            <pc:docMk/>
+            <pc:sldMk cId="3173105583" sldId="261"/>
+            <ac:cxnSpMk id="18" creationId="{C4831C6F-DB0F-7D26-9110-AC2434C1834F}"/>
+          </ac:cxnSpMkLst>
+        </pc:cxnChg>
+        <pc:cxnChg chg="add del mod ord">
+          <ac:chgData name="Johann Bock Severin" userId="3b36179260fc8001" providerId="LiveId" clId="{EE02F971-86F5-428E-BC14-A8CDA14DE2B7}" dt="2023-10-25T07:06:42.312" v="185" actId="478"/>
+          <ac:cxnSpMkLst>
+            <pc:docMk/>
+            <pc:sldMk cId="3173105583" sldId="261"/>
+            <ac:cxnSpMk id="19" creationId="{29251996-6313-F60E-02FA-5F12428BC9DD}"/>
+          </ac:cxnSpMkLst>
+        </pc:cxnChg>
+        <pc:cxnChg chg="del">
+          <ac:chgData name="Johann Bock Severin" userId="3b36179260fc8001" providerId="LiveId" clId="{EE02F971-86F5-428E-BC14-A8CDA14DE2B7}" dt="2023-10-25T07:03:24.310" v="72" actId="478"/>
+          <ac:cxnSpMkLst>
+            <pc:docMk/>
+            <pc:sldMk cId="3173105583" sldId="261"/>
+            <ac:cxnSpMk id="26" creationId="{CD417901-E7B1-AB50-B20A-A66F2A93F328}"/>
+          </ac:cxnSpMkLst>
+        </pc:cxnChg>
+        <pc:cxnChg chg="del">
+          <ac:chgData name="Johann Bock Severin" userId="3b36179260fc8001" providerId="LiveId" clId="{EE02F971-86F5-428E-BC14-A8CDA14DE2B7}" dt="2023-10-25T07:03:24.310" v="72" actId="478"/>
+          <ac:cxnSpMkLst>
+            <pc:docMk/>
+            <pc:sldMk cId="3173105583" sldId="261"/>
+            <ac:cxnSpMk id="27" creationId="{B6F57EC3-2C7B-9A1B-3D6F-B7EAE8FF958F}"/>
+          </ac:cxnSpMkLst>
+        </pc:cxnChg>
+        <pc:cxnChg chg="add mod ord topLvl">
+          <ac:chgData name="Johann Bock Severin" userId="3b36179260fc8001" providerId="LiveId" clId="{EE02F971-86F5-428E-BC14-A8CDA14DE2B7}" dt="2023-10-25T07:13:58.629" v="288" actId="165"/>
+          <ac:cxnSpMkLst>
+            <pc:docMk/>
+            <pc:sldMk cId="3173105583" sldId="261"/>
+            <ac:cxnSpMk id="31" creationId="{2612C4F3-4053-FFD7-FD35-843273412620}"/>
+          </ac:cxnSpMkLst>
+        </pc:cxnChg>
+        <pc:cxnChg chg="add mod ord topLvl">
+          <ac:chgData name="Johann Bock Severin" userId="3b36179260fc8001" providerId="LiveId" clId="{EE02F971-86F5-428E-BC14-A8CDA14DE2B7}" dt="2023-10-25T07:13:58.629" v="288" actId="165"/>
+          <ac:cxnSpMkLst>
+            <pc:docMk/>
+            <pc:sldMk cId="3173105583" sldId="261"/>
+            <ac:cxnSpMk id="38" creationId="{F8208307-89F0-0161-9846-A1C4454D7839}"/>
+          </ac:cxnSpMkLst>
+        </pc:cxnChg>
+        <pc:cxnChg chg="add mod ord topLvl">
+          <ac:chgData name="Johann Bock Severin" userId="3b36179260fc8001" providerId="LiveId" clId="{EE02F971-86F5-428E-BC14-A8CDA14DE2B7}" dt="2023-10-25T07:13:58.629" v="288" actId="165"/>
+          <ac:cxnSpMkLst>
+            <pc:docMk/>
+            <pc:sldMk cId="3173105583" sldId="261"/>
+            <ac:cxnSpMk id="40" creationId="{46803BB2-D4D1-E7C2-38BF-4E71A3521B3A}"/>
+          </ac:cxnSpMkLst>
+        </pc:cxnChg>
+        <pc:cxnChg chg="add mod ord topLvl">
+          <ac:chgData name="Johann Bock Severin" userId="3b36179260fc8001" providerId="LiveId" clId="{EE02F971-86F5-428E-BC14-A8CDA14DE2B7}" dt="2023-10-25T07:13:58.629" v="288" actId="165"/>
+          <ac:cxnSpMkLst>
+            <pc:docMk/>
+            <pc:sldMk cId="3173105583" sldId="261"/>
+            <ac:cxnSpMk id="41" creationId="{D26C6237-5E26-95D9-B269-50880E6E5112}"/>
+          </ac:cxnSpMkLst>
+        </pc:cxnChg>
+        <pc:cxnChg chg="add del">
+          <ac:chgData name="Johann Bock Severin" userId="3b36179260fc8001" providerId="LiveId" clId="{EE02F971-86F5-428E-BC14-A8CDA14DE2B7}" dt="2023-10-25T07:07:50.129" v="215" actId="11529"/>
+          <ac:cxnSpMkLst>
+            <pc:docMk/>
+            <pc:sldMk cId="3173105583" sldId="261"/>
+            <ac:cxnSpMk id="44" creationId="{C5229796-667F-0791-D005-5428C4507099}"/>
+          </ac:cxnSpMkLst>
+        </pc:cxnChg>
+        <pc:cxnChg chg="add del mod">
+          <ac:chgData name="Johann Bock Severin" userId="3b36179260fc8001" providerId="LiveId" clId="{EE02F971-86F5-428E-BC14-A8CDA14DE2B7}" dt="2023-10-25T07:09:16.118" v="241" actId="478"/>
+          <ac:cxnSpMkLst>
+            <pc:docMk/>
+            <pc:sldMk cId="3173105583" sldId="261"/>
+            <ac:cxnSpMk id="49" creationId="{B70BC5CE-E89E-AF40-9A84-EB600114631C}"/>
+          </ac:cxnSpMkLst>
+        </pc:cxnChg>
       </pc:sldChg>
       <pc:sldChg chg="del">
         <pc:chgData name="Johann Bock Severin" userId="3b36179260fc8001" providerId="LiveId" clId="{EE02F971-86F5-428E-BC14-A8CDA14DE2B7}" dt="2023-10-12T13:20:49.065" v="1" actId="47"/>
@@ -5112,7 +5568,7 @@
           <a:p>
             <a:fld id="{53BF19A1-7C9B-4536-8619-E606248327B6}" type="datetimeFigureOut">
               <a:rPr lang="en-DK" smtClean="0"/>
-              <a:t>12/10/2023</a:t>
+              <a:t>25/10/2023</a:t>
             </a:fld>
             <a:endParaRPr lang="en-DK"/>
           </a:p>
@@ -5529,7 +5985,7 @@
           <a:p>
             <a:fld id="{B21175D6-FCE9-4988-8B6E-5CB52F8DC15C}" type="datetimeFigureOut">
               <a:rPr lang="en-DK" smtClean="0"/>
-              <a:t>12/10/2023</a:t>
+              <a:t>25/10/2023</a:t>
             </a:fld>
             <a:endParaRPr lang="en-DK"/>
           </a:p>
@@ -5729,7 +6185,7 @@
           <a:p>
             <a:fld id="{B21175D6-FCE9-4988-8B6E-5CB52F8DC15C}" type="datetimeFigureOut">
               <a:rPr lang="en-DK" smtClean="0"/>
-              <a:t>12/10/2023</a:t>
+              <a:t>25/10/2023</a:t>
             </a:fld>
             <a:endParaRPr lang="en-DK"/>
           </a:p>
@@ -5939,7 +6395,7 @@
           <a:p>
             <a:fld id="{B21175D6-FCE9-4988-8B6E-5CB52F8DC15C}" type="datetimeFigureOut">
               <a:rPr lang="en-DK" smtClean="0"/>
-              <a:t>12/10/2023</a:t>
+              <a:t>25/10/2023</a:t>
             </a:fld>
             <a:endParaRPr lang="en-DK"/>
           </a:p>
@@ -6139,7 +6595,7 @@
           <a:p>
             <a:fld id="{B21175D6-FCE9-4988-8B6E-5CB52F8DC15C}" type="datetimeFigureOut">
               <a:rPr lang="en-DK" smtClean="0"/>
-              <a:t>12/10/2023</a:t>
+              <a:t>25/10/2023</a:t>
             </a:fld>
             <a:endParaRPr lang="en-DK"/>
           </a:p>
@@ -6415,7 +6871,7 @@
           <a:p>
             <a:fld id="{B21175D6-FCE9-4988-8B6E-5CB52F8DC15C}" type="datetimeFigureOut">
               <a:rPr lang="en-DK" smtClean="0"/>
-              <a:t>12/10/2023</a:t>
+              <a:t>25/10/2023</a:t>
             </a:fld>
             <a:endParaRPr lang="en-DK"/>
           </a:p>
@@ -6683,7 +7139,7 @@
           <a:p>
             <a:fld id="{B21175D6-FCE9-4988-8B6E-5CB52F8DC15C}" type="datetimeFigureOut">
               <a:rPr lang="en-DK" smtClean="0"/>
-              <a:t>12/10/2023</a:t>
+              <a:t>25/10/2023</a:t>
             </a:fld>
             <a:endParaRPr lang="en-DK"/>
           </a:p>
@@ -7098,7 +7554,7 @@
           <a:p>
             <a:fld id="{B21175D6-FCE9-4988-8B6E-5CB52F8DC15C}" type="datetimeFigureOut">
               <a:rPr lang="en-DK" smtClean="0"/>
-              <a:t>12/10/2023</a:t>
+              <a:t>25/10/2023</a:t>
             </a:fld>
             <a:endParaRPr lang="en-DK"/>
           </a:p>
@@ -7240,7 +7696,7 @@
           <a:p>
             <a:fld id="{B21175D6-FCE9-4988-8B6E-5CB52F8DC15C}" type="datetimeFigureOut">
               <a:rPr lang="en-DK" smtClean="0"/>
-              <a:t>12/10/2023</a:t>
+              <a:t>25/10/2023</a:t>
             </a:fld>
             <a:endParaRPr lang="en-DK"/>
           </a:p>
@@ -7353,7 +7809,7 @@
           <a:p>
             <a:fld id="{B21175D6-FCE9-4988-8B6E-5CB52F8DC15C}" type="datetimeFigureOut">
               <a:rPr lang="en-DK" smtClean="0"/>
-              <a:t>12/10/2023</a:t>
+              <a:t>25/10/2023</a:t>
             </a:fld>
             <a:endParaRPr lang="en-DK"/>
           </a:p>
@@ -7666,7 +8122,7 @@
           <a:p>
             <a:fld id="{B21175D6-FCE9-4988-8B6E-5CB52F8DC15C}" type="datetimeFigureOut">
               <a:rPr lang="en-DK" smtClean="0"/>
-              <a:t>12/10/2023</a:t>
+              <a:t>25/10/2023</a:t>
             </a:fld>
             <a:endParaRPr lang="en-DK"/>
           </a:p>
@@ -7955,7 +8411,7 @@
           <a:p>
             <a:fld id="{B21175D6-FCE9-4988-8B6E-5CB52F8DC15C}" type="datetimeFigureOut">
               <a:rPr lang="en-DK" smtClean="0"/>
-              <a:t>12/10/2023</a:t>
+              <a:t>25/10/2023</a:t>
             </a:fld>
             <a:endParaRPr lang="en-DK"/>
           </a:p>
@@ -8198,7 +8654,7 @@
           <a:p>
             <a:fld id="{B21175D6-FCE9-4988-8B6E-5CB52F8DC15C}" type="datetimeFigureOut">
               <a:rPr lang="en-DK" smtClean="0"/>
-              <a:t>12/10/2023</a:t>
+              <a:t>25/10/2023</a:t>
             </a:fld>
             <a:endParaRPr lang="en-DK"/>
           </a:p>
@@ -9745,8 +10201,8 @@
           </p:txBody>
         </p:sp>
       </p:grpSp>
-      <mc:AlternateContent xmlns:mc="http://schemas.openxmlformats.org/markup-compatibility/2006">
-        <mc:Choice xmlns:a14="http://schemas.microsoft.com/office/drawing/2010/main" Requires="a14">
+      <mc:AlternateContent xmlns:mc="http://schemas.openxmlformats.org/markup-compatibility/2006" xmlns:a14="http://schemas.microsoft.com/office/drawing/2010/main">
+        <mc:Choice Requires="a14">
           <p:sp>
             <p:nvSpPr>
               <p:cNvPr id="34" name="TextBox 33">
@@ -9775,6 +10231,7 @@
               </a:bodyPr>
               <a:lstStyle/>
               <a:p>
+                <a:pPr/>
                 <a14:m>
                   <m:oMathPara xmlns:m="http://schemas.openxmlformats.org/officeDocument/2006/math">
                     <m:oMathParaPr>
@@ -9802,7 +10259,7 @@
             </p:txBody>
           </p:sp>
         </mc:Choice>
-        <mc:Fallback>
+        <mc:Fallback xmlns="">
           <p:sp>
             <p:nvSpPr>
               <p:cNvPr id="34" name="TextBox 33">
@@ -9847,8 +10304,8 @@
           </p:sp>
         </mc:Fallback>
       </mc:AlternateContent>
-      <mc:AlternateContent xmlns:mc="http://schemas.openxmlformats.org/markup-compatibility/2006">
-        <mc:Choice xmlns:a14="http://schemas.microsoft.com/office/drawing/2010/main" Requires="a14">
+      <mc:AlternateContent xmlns:mc="http://schemas.openxmlformats.org/markup-compatibility/2006" xmlns:a14="http://schemas.microsoft.com/office/drawing/2010/main">
+        <mc:Choice Requires="a14">
           <p:sp>
             <p:nvSpPr>
               <p:cNvPr id="35" name="TextBox 34">
@@ -9877,6 +10334,7 @@
               </a:bodyPr>
               <a:lstStyle/>
               <a:p>
+                <a:pPr/>
                 <a14:m>
                   <m:oMathPara xmlns:m="http://schemas.openxmlformats.org/officeDocument/2006/math">
                     <m:oMathParaPr>
@@ -9904,7 +10362,7 @@
             </p:txBody>
           </p:sp>
         </mc:Choice>
-        <mc:Fallback>
+        <mc:Fallback xmlns="">
           <p:sp>
             <p:nvSpPr>
               <p:cNvPr id="35" name="TextBox 34">
@@ -9949,8 +10407,8 @@
           </p:sp>
         </mc:Fallback>
       </mc:AlternateContent>
-      <mc:AlternateContent xmlns:mc="http://schemas.openxmlformats.org/markup-compatibility/2006">
-        <mc:Choice xmlns:a14="http://schemas.microsoft.com/office/drawing/2010/main" Requires="a14">
+      <mc:AlternateContent xmlns:mc="http://schemas.openxmlformats.org/markup-compatibility/2006" xmlns:a14="http://schemas.microsoft.com/office/drawing/2010/main">
+        <mc:Choice Requires="a14">
           <p:sp>
             <p:nvSpPr>
               <p:cNvPr id="36" name="TextBox 35">
@@ -9979,6 +10437,7 @@
               </a:bodyPr>
               <a:lstStyle/>
               <a:p>
+                <a:pPr/>
                 <a14:m>
                   <m:oMathPara xmlns:m="http://schemas.openxmlformats.org/officeDocument/2006/math">
                     <m:oMathParaPr>
@@ -10031,7 +10490,7 @@
             </p:txBody>
           </p:sp>
         </mc:Choice>
-        <mc:Fallback>
+        <mc:Fallback xmlns="">
           <p:sp>
             <p:nvSpPr>
               <p:cNvPr id="36" name="TextBox 35">
@@ -10076,8 +10535,8 @@
           </p:sp>
         </mc:Fallback>
       </mc:AlternateContent>
-      <mc:AlternateContent xmlns:mc="http://schemas.openxmlformats.org/markup-compatibility/2006">
-        <mc:Choice xmlns:a14="http://schemas.microsoft.com/office/drawing/2010/main" Requires="a14">
+      <mc:AlternateContent xmlns:mc="http://schemas.openxmlformats.org/markup-compatibility/2006" xmlns:a14="http://schemas.microsoft.com/office/drawing/2010/main">
+        <mc:Choice Requires="a14">
           <p:sp>
             <p:nvSpPr>
               <p:cNvPr id="37" name="TextBox 36">
@@ -10106,6 +10565,7 @@
               </a:bodyPr>
               <a:lstStyle/>
               <a:p>
+                <a:pPr/>
                 <a14:m>
                   <m:oMathPara xmlns:m="http://schemas.openxmlformats.org/officeDocument/2006/math">
                     <m:oMathParaPr>
@@ -10158,7 +10618,7 @@
             </p:txBody>
           </p:sp>
         </mc:Choice>
-        <mc:Fallback>
+        <mc:Fallback xmlns="">
           <p:sp>
             <p:nvSpPr>
               <p:cNvPr id="37" name="TextBox 36">
@@ -10207,6 +10667,966 @@
     <p:extLst>
       <p:ext uri="{BB962C8B-B14F-4D97-AF65-F5344CB8AC3E}">
         <p14:creationId xmlns:p14="http://schemas.microsoft.com/office/powerpoint/2010/main" val="2845768841"/>
+      </p:ext>
+    </p:extLst>
+  </p:cSld>
+  <p:clrMapOvr>
+    <a:masterClrMapping/>
+  </p:clrMapOvr>
+  <mc:AlternateContent xmlns:mc="http://schemas.openxmlformats.org/markup-compatibility/2006" xmlns:p159="http://schemas.microsoft.com/office/powerpoint/2015/09/main">
+    <mc:Choice Requires="p159">
+      <p:transition>
+        <p159:morph option="byObject"/>
+      </p:transition>
+    </mc:Choice>
+    <mc:Fallback xmlns="">
+      <p:transition>
+        <p:fade/>
+      </p:transition>
+    </mc:Fallback>
+  </mc:AlternateContent>
+</p:sld>
+</file>
+
+<file path=ppt/slides/slide2.xml><?xml version="1.0" encoding="utf-8"?>
+<p:sld xmlns:a="http://schemas.openxmlformats.org/drawingml/2006/main" xmlns:r="http://schemas.openxmlformats.org/officeDocument/2006/relationships" xmlns:p="http://schemas.openxmlformats.org/presentationml/2006/main">
+  <p:cSld>
+    <p:spTree>
+      <p:nvGrpSpPr>
+        <p:cNvPr id="1" name=""/>
+        <p:cNvGrpSpPr/>
+        <p:nvPr/>
+      </p:nvGrpSpPr>
+      <p:grpSpPr>
+        <a:xfrm>
+          <a:off x="0" y="0"/>
+          <a:ext cx="0" cy="0"/>
+          <a:chOff x="0" y="0"/>
+          <a:chExt cx="0" cy="0"/>
+        </a:xfrm>
+      </p:grpSpPr>
+      <p:sp>
+        <p:nvSpPr>
+          <p:cNvPr id="59" name="Rectangle 58">
+            <a:extLst>
+              <a:ext uri="{FF2B5EF4-FFF2-40B4-BE49-F238E27FC236}">
+                <a16:creationId xmlns:a16="http://schemas.microsoft.com/office/drawing/2014/main" id="{3FD39345-4398-2712-0603-439135989AAC}"/>
+              </a:ext>
+            </a:extLst>
+          </p:cNvPr>
+          <p:cNvSpPr/>
+          <p:nvPr/>
+        </p:nvSpPr>
+        <p:spPr>
+          <a:xfrm rot="10800000" flipH="1" flipV="1">
+            <a:off x="4620851" y="662943"/>
+            <a:ext cx="1314021" cy="3177541"/>
+          </a:xfrm>
+          <a:prstGeom prst="rect">
+            <a:avLst/>
+          </a:prstGeom>
+          <a:noFill/>
+          <a:ln w="38100">
+            <a:solidFill>
+              <a:schemeClr val="accent3"/>
+            </a:solidFill>
+          </a:ln>
+        </p:spPr>
+        <p:style>
+          <a:lnRef idx="2">
+            <a:schemeClr val="accent1">
+              <a:shade val="15000"/>
+            </a:schemeClr>
+          </a:lnRef>
+          <a:fillRef idx="1">
+            <a:schemeClr val="accent1"/>
+          </a:fillRef>
+          <a:effectRef idx="0">
+            <a:schemeClr val="accent1"/>
+          </a:effectRef>
+          <a:fontRef idx="minor">
+            <a:schemeClr val="lt1"/>
+          </a:fontRef>
+        </p:style>
+        <p:txBody>
+          <a:bodyPr rtlCol="0" anchor="ctr"/>
+          <a:lstStyle/>
+          <a:p>
+            <a:pPr algn="ctr"/>
+            <a:endParaRPr lang="en-DK"/>
+          </a:p>
+        </p:txBody>
+      </p:sp>
+      <p:sp>
+        <p:nvSpPr>
+          <p:cNvPr id="60" name="Rectangle 59">
+            <a:extLst>
+              <a:ext uri="{FF2B5EF4-FFF2-40B4-BE49-F238E27FC236}">
+                <a16:creationId xmlns:a16="http://schemas.microsoft.com/office/drawing/2014/main" id="{C3BC3275-DC34-ED66-7695-AD40AAF39854}"/>
+              </a:ext>
+            </a:extLst>
+          </p:cNvPr>
+          <p:cNvSpPr/>
+          <p:nvPr/>
+        </p:nvSpPr>
+        <p:spPr>
+          <a:xfrm rot="10800000" flipH="1" flipV="1">
+            <a:off x="4501788" y="748668"/>
+            <a:ext cx="1557334" cy="3177541"/>
+          </a:xfrm>
+          <a:prstGeom prst="rect">
+            <a:avLst/>
+          </a:prstGeom>
+          <a:noFill/>
+          <a:ln w="38100">
+            <a:solidFill>
+              <a:schemeClr val="accent3"/>
+            </a:solidFill>
+          </a:ln>
+        </p:spPr>
+        <p:style>
+          <a:lnRef idx="2">
+            <a:schemeClr val="accent1">
+              <a:shade val="15000"/>
+            </a:schemeClr>
+          </a:lnRef>
+          <a:fillRef idx="1">
+            <a:schemeClr val="accent1"/>
+          </a:fillRef>
+          <a:effectRef idx="0">
+            <a:schemeClr val="accent1"/>
+          </a:effectRef>
+          <a:fontRef idx="minor">
+            <a:schemeClr val="lt1"/>
+          </a:fontRef>
+        </p:style>
+        <p:txBody>
+          <a:bodyPr rtlCol="0" anchor="ctr"/>
+          <a:lstStyle/>
+          <a:p>
+            <a:pPr algn="ctr"/>
+            <a:endParaRPr lang="en-DK"/>
+          </a:p>
+        </p:txBody>
+      </p:sp>
+      <p:sp>
+        <p:nvSpPr>
+          <p:cNvPr id="57" name="Rectangle 56">
+            <a:extLst>
+              <a:ext uri="{FF2B5EF4-FFF2-40B4-BE49-F238E27FC236}">
+                <a16:creationId xmlns:a16="http://schemas.microsoft.com/office/drawing/2014/main" id="{E346330F-AB5E-2470-08A1-02FD04071A1B}"/>
+              </a:ext>
+            </a:extLst>
+          </p:cNvPr>
+          <p:cNvSpPr/>
+          <p:nvPr/>
+        </p:nvSpPr>
+        <p:spPr>
+          <a:xfrm rot="10800000" flipH="1" flipV="1">
+            <a:off x="3376821" y="893456"/>
+            <a:ext cx="3172974" cy="3177541"/>
+          </a:xfrm>
+          <a:prstGeom prst="rect">
+            <a:avLst/>
+          </a:prstGeom>
+          <a:noFill/>
+          <a:ln w="38100">
+            <a:solidFill>
+              <a:schemeClr val="accent2"/>
+            </a:solidFill>
+          </a:ln>
+        </p:spPr>
+        <p:style>
+          <a:lnRef idx="2">
+            <a:schemeClr val="accent1">
+              <a:shade val="15000"/>
+            </a:schemeClr>
+          </a:lnRef>
+          <a:fillRef idx="1">
+            <a:schemeClr val="accent1"/>
+          </a:fillRef>
+          <a:effectRef idx="0">
+            <a:schemeClr val="accent1"/>
+          </a:effectRef>
+          <a:fontRef idx="minor">
+            <a:schemeClr val="lt1"/>
+          </a:fontRef>
+        </p:style>
+        <p:txBody>
+          <a:bodyPr rtlCol="0" anchor="ctr"/>
+          <a:lstStyle/>
+          <a:p>
+            <a:pPr algn="ctr"/>
+            <a:endParaRPr lang="en-DK"/>
+          </a:p>
+        </p:txBody>
+      </p:sp>
+      <p:sp>
+        <p:nvSpPr>
+          <p:cNvPr id="58" name="Rectangle 57">
+            <a:extLst>
+              <a:ext uri="{FF2B5EF4-FFF2-40B4-BE49-F238E27FC236}">
+                <a16:creationId xmlns:a16="http://schemas.microsoft.com/office/drawing/2014/main" id="{0FA9454D-43BD-2B3B-01E5-F3211E5D5906}"/>
+              </a:ext>
+            </a:extLst>
+          </p:cNvPr>
+          <p:cNvSpPr/>
+          <p:nvPr/>
+        </p:nvSpPr>
+        <p:spPr>
+          <a:xfrm rot="10800000" flipH="1" flipV="1">
+            <a:off x="3301638" y="972506"/>
+            <a:ext cx="3321846" cy="3177541"/>
+          </a:xfrm>
+          <a:prstGeom prst="rect">
+            <a:avLst/>
+          </a:prstGeom>
+          <a:noFill/>
+          <a:ln w="38100">
+            <a:solidFill>
+              <a:schemeClr val="accent2"/>
+            </a:solidFill>
+          </a:ln>
+        </p:spPr>
+        <p:style>
+          <a:lnRef idx="2">
+            <a:schemeClr val="accent1">
+              <a:shade val="15000"/>
+            </a:schemeClr>
+          </a:lnRef>
+          <a:fillRef idx="1">
+            <a:schemeClr val="accent1"/>
+          </a:fillRef>
+          <a:effectRef idx="0">
+            <a:schemeClr val="accent1"/>
+          </a:effectRef>
+          <a:fontRef idx="minor">
+            <a:schemeClr val="lt1"/>
+          </a:fontRef>
+        </p:style>
+        <p:txBody>
+          <a:bodyPr rtlCol="0" anchor="ctr"/>
+          <a:lstStyle/>
+          <a:p>
+            <a:pPr algn="ctr"/>
+            <a:endParaRPr lang="en-DK"/>
+          </a:p>
+        </p:txBody>
+      </p:sp>
+      <p:sp>
+        <p:nvSpPr>
+          <p:cNvPr id="56" name="Rectangle 55">
+            <a:extLst>
+              <a:ext uri="{FF2B5EF4-FFF2-40B4-BE49-F238E27FC236}">
+                <a16:creationId xmlns:a16="http://schemas.microsoft.com/office/drawing/2014/main" id="{C1D4D9A4-6DDE-355F-C146-D54C9B2FB3C9}"/>
+              </a:ext>
+            </a:extLst>
+          </p:cNvPr>
+          <p:cNvSpPr/>
+          <p:nvPr/>
+        </p:nvSpPr>
+        <p:spPr>
+          <a:xfrm rot="10800000" flipH="1" flipV="1">
+            <a:off x="2272938" y="1043944"/>
+            <a:ext cx="4716204" cy="3286123"/>
+          </a:xfrm>
+          <a:prstGeom prst="rect">
+            <a:avLst/>
+          </a:prstGeom>
+          <a:noFill/>
+          <a:ln w="38100">
+            <a:solidFill>
+              <a:schemeClr val="accent1"/>
+            </a:solidFill>
+          </a:ln>
+        </p:spPr>
+        <p:style>
+          <a:lnRef idx="2">
+            <a:schemeClr val="accent1">
+              <a:shade val="15000"/>
+            </a:schemeClr>
+          </a:lnRef>
+          <a:fillRef idx="1">
+            <a:schemeClr val="accent1"/>
+          </a:fillRef>
+          <a:effectRef idx="0">
+            <a:schemeClr val="accent1"/>
+          </a:effectRef>
+          <a:fontRef idx="minor">
+            <a:schemeClr val="lt1"/>
+          </a:fontRef>
+        </p:style>
+        <p:txBody>
+          <a:bodyPr rtlCol="0" anchor="ctr"/>
+          <a:lstStyle/>
+          <a:p>
+            <a:pPr algn="ctr"/>
+            <a:endParaRPr lang="en-DK"/>
+          </a:p>
+        </p:txBody>
+      </p:sp>
+      <p:sp>
+        <p:nvSpPr>
+          <p:cNvPr id="53" name="Rectangle 52">
+            <a:extLst>
+              <a:ext uri="{FF2B5EF4-FFF2-40B4-BE49-F238E27FC236}">
+                <a16:creationId xmlns:a16="http://schemas.microsoft.com/office/drawing/2014/main" id="{C0BEB1B5-B15D-D442-3378-E280584ABA9D}"/>
+              </a:ext>
+            </a:extLst>
+          </p:cNvPr>
+          <p:cNvSpPr/>
+          <p:nvPr/>
+        </p:nvSpPr>
+        <p:spPr>
+          <a:xfrm rot="10800000" flipH="1" flipV="1">
+            <a:off x="2153875" y="1129669"/>
+            <a:ext cx="4937483" cy="3286123"/>
+          </a:xfrm>
+          <a:prstGeom prst="rect">
+            <a:avLst/>
+          </a:prstGeom>
+          <a:noFill/>
+          <a:ln w="38100">
+            <a:solidFill>
+              <a:schemeClr val="accent1"/>
+            </a:solidFill>
+          </a:ln>
+        </p:spPr>
+        <p:style>
+          <a:lnRef idx="2">
+            <a:schemeClr val="accent1">
+              <a:shade val="15000"/>
+            </a:schemeClr>
+          </a:lnRef>
+          <a:fillRef idx="1">
+            <a:schemeClr val="accent1"/>
+          </a:fillRef>
+          <a:effectRef idx="0">
+            <a:schemeClr val="accent1"/>
+          </a:effectRef>
+          <a:fontRef idx="minor">
+            <a:schemeClr val="lt1"/>
+          </a:fontRef>
+        </p:style>
+        <p:txBody>
+          <a:bodyPr rtlCol="0" anchor="ctr"/>
+          <a:lstStyle/>
+          <a:p>
+            <a:pPr algn="ctr"/>
+            <a:endParaRPr lang="en-DK"/>
+          </a:p>
+        </p:txBody>
+      </p:sp>
+      <p:sp>
+        <p:nvSpPr>
+          <p:cNvPr id="55" name="Rectangle 54">
+            <a:extLst>
+              <a:ext uri="{FF2B5EF4-FFF2-40B4-BE49-F238E27FC236}">
+                <a16:creationId xmlns:a16="http://schemas.microsoft.com/office/drawing/2014/main" id="{F9BDB2CA-83E4-4A46-D204-7719DF0F64D2}"/>
+              </a:ext>
+            </a:extLst>
+          </p:cNvPr>
+          <p:cNvSpPr/>
+          <p:nvPr/>
+        </p:nvSpPr>
+        <p:spPr>
+          <a:xfrm rot="10800000" flipH="1">
+            <a:off x="659426" y="112544"/>
+            <a:ext cx="7477125" cy="3492825"/>
+          </a:xfrm>
+          <a:prstGeom prst="rect">
+            <a:avLst/>
+          </a:prstGeom>
+          <a:solidFill>
+            <a:schemeClr val="bg1"/>
+          </a:solidFill>
+          <a:ln>
+            <a:noFill/>
+          </a:ln>
+        </p:spPr>
+        <p:style>
+          <a:lnRef idx="2">
+            <a:schemeClr val="accent1">
+              <a:shade val="15000"/>
+            </a:schemeClr>
+          </a:lnRef>
+          <a:fillRef idx="1">
+            <a:schemeClr val="accent1"/>
+          </a:fillRef>
+          <a:effectRef idx="0">
+            <a:schemeClr val="accent1"/>
+          </a:effectRef>
+          <a:fontRef idx="minor">
+            <a:schemeClr val="lt1"/>
+          </a:fontRef>
+        </p:style>
+        <p:txBody>
+          <a:bodyPr rtlCol="0" anchor="ctr"/>
+          <a:lstStyle/>
+          <a:p>
+            <a:pPr algn="ctr"/>
+            <a:endParaRPr lang="en-DK"/>
+          </a:p>
+        </p:txBody>
+      </p:sp>
+      <p:sp>
+        <p:nvSpPr>
+          <p:cNvPr id="22" name="TextBox 21">
+            <a:extLst>
+              <a:ext uri="{FF2B5EF4-FFF2-40B4-BE49-F238E27FC236}">
+                <a16:creationId xmlns:a16="http://schemas.microsoft.com/office/drawing/2014/main" id="{D0721B8C-EC7D-4E9E-DD95-638F89F64F0D}"/>
+              </a:ext>
+            </a:extLst>
+          </p:cNvPr>
+          <p:cNvSpPr txBox="1"/>
+          <p:nvPr/>
+        </p:nvSpPr>
+        <p:spPr>
+          <a:xfrm flipH="1">
+            <a:off x="1092265" y="2029858"/>
+            <a:ext cx="928459" cy="646331"/>
+          </a:xfrm>
+          <a:prstGeom prst="rect">
+            <a:avLst/>
+          </a:prstGeom>
+          <a:noFill/>
+        </p:spPr>
+        <p:txBody>
+          <a:bodyPr wrap="none" rtlCol="0">
+            <a:spAutoFit/>
+          </a:bodyPr>
+          <a:lstStyle/>
+          <a:p>
+            <a:r>
+              <a:rPr lang="en-US" dirty="0"/>
+              <a:t>Qubit </a:t>
+            </a:r>
+          </a:p>
+          <a:p>
+            <a:r>
+              <a:rPr lang="en-US" dirty="0"/>
+              <a:t>Control</a:t>
+            </a:r>
+            <a:endParaRPr lang="en-DK" dirty="0"/>
+          </a:p>
+        </p:txBody>
+      </p:sp>
+      <p:sp>
+        <p:nvSpPr>
+          <p:cNvPr id="54" name="Cylinder 53">
+            <a:extLst>
+              <a:ext uri="{FF2B5EF4-FFF2-40B4-BE49-F238E27FC236}">
+                <a16:creationId xmlns:a16="http://schemas.microsoft.com/office/drawing/2014/main" id="{1A06878E-7146-7FF7-9E21-486E4BD9A082}"/>
+              </a:ext>
+            </a:extLst>
+          </p:cNvPr>
+          <p:cNvSpPr/>
+          <p:nvPr/>
+        </p:nvSpPr>
+        <p:spPr>
+          <a:xfrm rot="10800000" flipH="1" flipV="1">
+            <a:off x="5731674" y="735335"/>
+            <a:ext cx="1557334" cy="3095625"/>
+          </a:xfrm>
+          <a:prstGeom prst="can">
+            <a:avLst/>
+          </a:prstGeom>
+          <a:solidFill>
+            <a:schemeClr val="bg1">
+              <a:lumMod val="65000"/>
+            </a:schemeClr>
+          </a:solidFill>
+        </p:spPr>
+        <p:style>
+          <a:lnRef idx="2">
+            <a:schemeClr val="accent1">
+              <a:shade val="15000"/>
+            </a:schemeClr>
+          </a:lnRef>
+          <a:fillRef idx="1">
+            <a:schemeClr val="accent1"/>
+          </a:fillRef>
+          <a:effectRef idx="0">
+            <a:schemeClr val="accent1"/>
+          </a:effectRef>
+          <a:fontRef idx="minor">
+            <a:schemeClr val="lt1"/>
+          </a:fontRef>
+        </p:style>
+        <p:txBody>
+          <a:bodyPr rtlCol="0" anchor="ctr"/>
+          <a:lstStyle/>
+          <a:p>
+            <a:pPr algn="ctr"/>
+            <a:r>
+              <a:rPr lang="en-US" dirty="0"/>
+              <a:t>T5</a:t>
+            </a:r>
+          </a:p>
+          <a:p>
+            <a:pPr algn="ctr"/>
+            <a:r>
+              <a:rPr lang="en-US" dirty="0"/>
+              <a:t>Oxford Fridge</a:t>
+            </a:r>
+            <a:endParaRPr lang="en-DK" dirty="0"/>
+          </a:p>
+        </p:txBody>
+      </p:sp>
+      <p:cxnSp>
+        <p:nvCxnSpPr>
+          <p:cNvPr id="40" name="Straight Connector 39">
+            <a:extLst>
+              <a:ext uri="{FF2B5EF4-FFF2-40B4-BE49-F238E27FC236}">
+                <a16:creationId xmlns:a16="http://schemas.microsoft.com/office/drawing/2014/main" id="{46803BB2-D4D1-E7C2-38BF-4E71A3521B3A}"/>
+              </a:ext>
+            </a:extLst>
+          </p:cNvPr>
+          <p:cNvCxnSpPr>
+            <a:cxnSpLocks/>
+          </p:cNvCxnSpPr>
+          <p:nvPr/>
+        </p:nvCxnSpPr>
+        <p:spPr>
+          <a:xfrm rot="10800000" flipH="1" flipV="1">
+            <a:off x="4614727" y="1795606"/>
+            <a:ext cx="0" cy="1156479"/>
+          </a:xfrm>
+          <a:prstGeom prst="line">
+            <a:avLst/>
+          </a:prstGeom>
+          <a:ln w="38100">
+            <a:solidFill>
+              <a:schemeClr val="accent3"/>
+            </a:solidFill>
+          </a:ln>
+        </p:spPr>
+        <p:style>
+          <a:lnRef idx="1">
+            <a:schemeClr val="accent1"/>
+          </a:lnRef>
+          <a:fillRef idx="0">
+            <a:schemeClr val="accent1"/>
+          </a:fillRef>
+          <a:effectRef idx="0">
+            <a:schemeClr val="accent1"/>
+          </a:effectRef>
+          <a:fontRef idx="minor">
+            <a:schemeClr val="tx1"/>
+          </a:fontRef>
+        </p:style>
+      </p:cxnSp>
+      <p:cxnSp>
+        <p:nvCxnSpPr>
+          <p:cNvPr id="31" name="Straight Connector 30">
+            <a:extLst>
+              <a:ext uri="{FF2B5EF4-FFF2-40B4-BE49-F238E27FC236}">
+                <a16:creationId xmlns:a16="http://schemas.microsoft.com/office/drawing/2014/main" id="{2612C4F3-4053-FFD7-FD35-843273412620}"/>
+              </a:ext>
+            </a:extLst>
+          </p:cNvPr>
+          <p:cNvCxnSpPr>
+            <a:cxnSpLocks/>
+          </p:cNvCxnSpPr>
+          <p:nvPr/>
+        </p:nvCxnSpPr>
+        <p:spPr>
+          <a:xfrm rot="10800000" flipH="1" flipV="1">
+            <a:off x="3413760" y="1817376"/>
+            <a:ext cx="0" cy="1156479"/>
+          </a:xfrm>
+          <a:prstGeom prst="line">
+            <a:avLst/>
+          </a:prstGeom>
+          <a:ln w="38100">
+            <a:solidFill>
+              <a:schemeClr val="accent2"/>
+            </a:solidFill>
+          </a:ln>
+        </p:spPr>
+        <p:style>
+          <a:lnRef idx="1">
+            <a:schemeClr val="accent1"/>
+          </a:lnRef>
+          <a:fillRef idx="0">
+            <a:schemeClr val="accent1"/>
+          </a:fillRef>
+          <a:effectRef idx="0">
+            <a:schemeClr val="accent1"/>
+          </a:effectRef>
+          <a:fontRef idx="minor">
+            <a:schemeClr val="tx1"/>
+          </a:fontRef>
+        </p:style>
+      </p:cxnSp>
+      <p:cxnSp>
+        <p:nvCxnSpPr>
+          <p:cNvPr id="38" name="Straight Connector 37">
+            <a:extLst>
+              <a:ext uri="{FF2B5EF4-FFF2-40B4-BE49-F238E27FC236}">
+                <a16:creationId xmlns:a16="http://schemas.microsoft.com/office/drawing/2014/main" id="{F8208307-89F0-0161-9846-A1C4454D7839}"/>
+              </a:ext>
+            </a:extLst>
+          </p:cNvPr>
+          <p:cNvCxnSpPr>
+            <a:cxnSpLocks/>
+          </p:cNvCxnSpPr>
+          <p:nvPr/>
+        </p:nvCxnSpPr>
+        <p:spPr>
+          <a:xfrm rot="10800000" flipH="1" flipV="1">
+            <a:off x="3301637" y="1817375"/>
+            <a:ext cx="0" cy="1156479"/>
+          </a:xfrm>
+          <a:prstGeom prst="line">
+            <a:avLst/>
+          </a:prstGeom>
+          <a:ln w="38100">
+            <a:solidFill>
+              <a:schemeClr val="accent2"/>
+            </a:solidFill>
+          </a:ln>
+        </p:spPr>
+        <p:style>
+          <a:lnRef idx="1">
+            <a:schemeClr val="accent1"/>
+          </a:lnRef>
+          <a:fillRef idx="0">
+            <a:schemeClr val="accent1"/>
+          </a:fillRef>
+          <a:effectRef idx="0">
+            <a:schemeClr val="accent1"/>
+          </a:effectRef>
+          <a:fontRef idx="minor">
+            <a:schemeClr val="tx1"/>
+          </a:fontRef>
+        </p:style>
+      </p:cxnSp>
+      <p:cxnSp>
+        <p:nvCxnSpPr>
+          <p:cNvPr id="41" name="Straight Connector 40">
+            <a:extLst>
+              <a:ext uri="{FF2B5EF4-FFF2-40B4-BE49-F238E27FC236}">
+                <a16:creationId xmlns:a16="http://schemas.microsoft.com/office/drawing/2014/main" id="{D26C6237-5E26-95D9-B269-50880E6E5112}"/>
+              </a:ext>
+            </a:extLst>
+          </p:cNvPr>
+          <p:cNvCxnSpPr>
+            <a:cxnSpLocks/>
+          </p:cNvCxnSpPr>
+          <p:nvPr/>
+        </p:nvCxnSpPr>
+        <p:spPr>
+          <a:xfrm rot="10800000" flipH="1" flipV="1">
+            <a:off x="4502604" y="1795605"/>
+            <a:ext cx="0" cy="1156479"/>
+          </a:xfrm>
+          <a:prstGeom prst="line">
+            <a:avLst/>
+          </a:prstGeom>
+          <a:ln w="38100">
+            <a:solidFill>
+              <a:schemeClr val="accent3"/>
+            </a:solidFill>
+          </a:ln>
+        </p:spPr>
+        <p:style>
+          <a:lnRef idx="1">
+            <a:schemeClr val="accent1"/>
+          </a:lnRef>
+          <a:fillRef idx="0">
+            <a:schemeClr val="accent1"/>
+          </a:fillRef>
+          <a:effectRef idx="0">
+            <a:schemeClr val="accent1"/>
+          </a:effectRef>
+          <a:fontRef idx="minor">
+            <a:schemeClr val="tx1"/>
+          </a:fontRef>
+        </p:style>
+      </p:cxnSp>
+      <p:cxnSp>
+        <p:nvCxnSpPr>
+          <p:cNvPr id="8" name="Straight Connector 7">
+            <a:extLst>
+              <a:ext uri="{FF2B5EF4-FFF2-40B4-BE49-F238E27FC236}">
+                <a16:creationId xmlns:a16="http://schemas.microsoft.com/office/drawing/2014/main" id="{A9190892-E86C-11B3-D082-4A38D46B3825}"/>
+              </a:ext>
+            </a:extLst>
+          </p:cNvPr>
+          <p:cNvCxnSpPr>
+            <a:cxnSpLocks/>
+          </p:cNvCxnSpPr>
+          <p:nvPr/>
+        </p:nvCxnSpPr>
+        <p:spPr>
+          <a:xfrm rot="10800000" flipH="1" flipV="1">
+            <a:off x="2265997" y="1769751"/>
+            <a:ext cx="0" cy="1156479"/>
+          </a:xfrm>
+          <a:prstGeom prst="line">
+            <a:avLst/>
+          </a:prstGeom>
+          <a:ln w="38100"/>
+        </p:spPr>
+        <p:style>
+          <a:lnRef idx="1">
+            <a:schemeClr val="accent1"/>
+          </a:lnRef>
+          <a:fillRef idx="0">
+            <a:schemeClr val="accent1"/>
+          </a:fillRef>
+          <a:effectRef idx="0">
+            <a:schemeClr val="accent1"/>
+          </a:effectRef>
+          <a:fontRef idx="minor">
+            <a:schemeClr val="tx1"/>
+          </a:fontRef>
+        </p:style>
+      </p:cxnSp>
+      <p:cxnSp>
+        <p:nvCxnSpPr>
+          <p:cNvPr id="7" name="Straight Connector 6">
+            <a:extLst>
+              <a:ext uri="{FF2B5EF4-FFF2-40B4-BE49-F238E27FC236}">
+                <a16:creationId xmlns:a16="http://schemas.microsoft.com/office/drawing/2014/main" id="{1B71BCC7-9052-4F74-A912-CF3D282CE2AB}"/>
+              </a:ext>
+            </a:extLst>
+          </p:cNvPr>
+          <p:cNvCxnSpPr>
+            <a:cxnSpLocks/>
+          </p:cNvCxnSpPr>
+          <p:nvPr/>
+        </p:nvCxnSpPr>
+        <p:spPr>
+          <a:xfrm rot="10800000" flipH="1" flipV="1">
+            <a:off x="2153874" y="1769750"/>
+            <a:ext cx="0" cy="1156479"/>
+          </a:xfrm>
+          <a:prstGeom prst="line">
+            <a:avLst/>
+          </a:prstGeom>
+          <a:ln w="38100"/>
+        </p:spPr>
+        <p:style>
+          <a:lnRef idx="1">
+            <a:schemeClr val="accent1"/>
+          </a:lnRef>
+          <a:fillRef idx="0">
+            <a:schemeClr val="accent1"/>
+          </a:fillRef>
+          <a:effectRef idx="0">
+            <a:schemeClr val="accent1"/>
+          </a:effectRef>
+          <a:fontRef idx="minor">
+            <a:schemeClr val="tx1"/>
+          </a:fontRef>
+        </p:style>
+      </p:cxnSp>
+      <p:sp>
+        <p:nvSpPr>
+          <p:cNvPr id="2" name="Rectangle: Rounded Corners 1">
+            <a:extLst>
+              <a:ext uri="{FF2B5EF4-FFF2-40B4-BE49-F238E27FC236}">
+                <a16:creationId xmlns:a16="http://schemas.microsoft.com/office/drawing/2014/main" id="{5EF86225-4E04-4E4E-CD82-DF84FBE8C747}"/>
+              </a:ext>
+            </a:extLst>
+          </p:cNvPr>
+          <p:cNvSpPr/>
+          <p:nvPr/>
+        </p:nvSpPr>
+        <p:spPr>
+          <a:xfrm rot="10800000" flipH="1" flipV="1">
+            <a:off x="1862817" y="2785803"/>
+            <a:ext cx="2955109" cy="966107"/>
+          </a:xfrm>
+          <a:prstGeom prst="roundRect">
+            <a:avLst/>
+          </a:prstGeom>
+          <a:solidFill>
+            <a:schemeClr val="tx1">
+              <a:lumMod val="75000"/>
+              <a:lumOff val="25000"/>
+            </a:schemeClr>
+          </a:solidFill>
+          <a:ln w="38100">
+            <a:noFill/>
+          </a:ln>
+        </p:spPr>
+        <p:style>
+          <a:lnRef idx="2">
+            <a:schemeClr val="dk1">
+              <a:shade val="15000"/>
+            </a:schemeClr>
+          </a:lnRef>
+          <a:fillRef idx="1">
+            <a:schemeClr val="dk1"/>
+          </a:fillRef>
+          <a:effectRef idx="0">
+            <a:schemeClr val="dk1"/>
+          </a:effectRef>
+          <a:fontRef idx="minor">
+            <a:schemeClr val="lt1"/>
+          </a:fontRef>
+        </p:style>
+        <p:txBody>
+          <a:bodyPr rtlCol="0" anchor="ctr"/>
+          <a:lstStyle/>
+          <a:p>
+            <a:pPr algn="ctr"/>
+            <a:r>
+              <a:rPr lang="en-US" dirty="0"/>
+              <a:t>Octave</a:t>
+            </a:r>
+          </a:p>
+        </p:txBody>
+      </p:sp>
+      <p:sp>
+        <p:nvSpPr>
+          <p:cNvPr id="5" name="Rectangle: Rounded Corners 4">
+            <a:extLst>
+              <a:ext uri="{FF2B5EF4-FFF2-40B4-BE49-F238E27FC236}">
+                <a16:creationId xmlns:a16="http://schemas.microsoft.com/office/drawing/2014/main" id="{B2A3E9D7-DC25-C9D7-1951-0B87BBDE781D}"/>
+              </a:ext>
+            </a:extLst>
+          </p:cNvPr>
+          <p:cNvSpPr/>
+          <p:nvPr/>
+        </p:nvSpPr>
+        <p:spPr>
+          <a:xfrm rot="10800000" flipH="1" flipV="1">
+            <a:off x="1862817" y="1054975"/>
+            <a:ext cx="2955109" cy="966107"/>
+          </a:xfrm>
+          <a:prstGeom prst="roundRect">
+            <a:avLst/>
+          </a:prstGeom>
+          <a:solidFill>
+            <a:schemeClr val="tx1">
+              <a:lumMod val="75000"/>
+              <a:lumOff val="25000"/>
+            </a:schemeClr>
+          </a:solidFill>
+          <a:ln w="38100">
+            <a:noFill/>
+          </a:ln>
+        </p:spPr>
+        <p:style>
+          <a:lnRef idx="2">
+            <a:schemeClr val="dk1">
+              <a:shade val="15000"/>
+            </a:schemeClr>
+          </a:lnRef>
+          <a:fillRef idx="1">
+            <a:schemeClr val="dk1"/>
+          </a:fillRef>
+          <a:effectRef idx="0">
+            <a:schemeClr val="dk1"/>
+          </a:effectRef>
+          <a:fontRef idx="minor">
+            <a:schemeClr val="lt1"/>
+          </a:fontRef>
+        </p:style>
+        <p:txBody>
+          <a:bodyPr rtlCol="0" anchor="ctr"/>
+          <a:lstStyle/>
+          <a:p>
+            <a:pPr algn="ctr"/>
+            <a:r>
+              <a:rPr lang="en-US" dirty="0"/>
+              <a:t>OPX</a:t>
+            </a:r>
+          </a:p>
+        </p:txBody>
+      </p:sp>
+      <p:sp>
+        <p:nvSpPr>
+          <p:cNvPr id="29" name="TextBox 28">
+            <a:extLst>
+              <a:ext uri="{FF2B5EF4-FFF2-40B4-BE49-F238E27FC236}">
+                <a16:creationId xmlns:a16="http://schemas.microsoft.com/office/drawing/2014/main" id="{9F6986DC-0E7A-0087-A9A1-BEC73335CC22}"/>
+              </a:ext>
+            </a:extLst>
+          </p:cNvPr>
+          <p:cNvSpPr txBox="1"/>
+          <p:nvPr/>
+        </p:nvSpPr>
+        <p:spPr>
+          <a:xfrm rot="10800000" flipH="1" flipV="1">
+            <a:off x="2391728" y="2080277"/>
+            <a:ext cx="928459" cy="646331"/>
+          </a:xfrm>
+          <a:prstGeom prst="rect">
+            <a:avLst/>
+          </a:prstGeom>
+          <a:noFill/>
+        </p:spPr>
+        <p:txBody>
+          <a:bodyPr wrap="none" rtlCol="0">
+            <a:spAutoFit/>
+          </a:bodyPr>
+          <a:lstStyle/>
+          <a:p>
+            <a:r>
+              <a:rPr lang="en-US" dirty="0"/>
+              <a:t>Reso </a:t>
+            </a:r>
+          </a:p>
+          <a:p>
+            <a:r>
+              <a:rPr lang="en-US" dirty="0"/>
+              <a:t>Control</a:t>
+            </a:r>
+            <a:endParaRPr lang="en-DK" dirty="0"/>
+          </a:p>
+        </p:txBody>
+      </p:sp>
+      <p:sp>
+        <p:nvSpPr>
+          <p:cNvPr id="39" name="TextBox 38">
+            <a:extLst>
+              <a:ext uri="{FF2B5EF4-FFF2-40B4-BE49-F238E27FC236}">
+                <a16:creationId xmlns:a16="http://schemas.microsoft.com/office/drawing/2014/main" id="{3752E311-7594-CFE0-99BB-7DC73D818C3B}"/>
+              </a:ext>
+            </a:extLst>
+          </p:cNvPr>
+          <p:cNvSpPr txBox="1"/>
+          <p:nvPr/>
+        </p:nvSpPr>
+        <p:spPr>
+          <a:xfrm rot="10800000" flipH="1" flipV="1">
+            <a:off x="3592695" y="2058507"/>
+            <a:ext cx="877163" cy="646331"/>
+          </a:xfrm>
+          <a:prstGeom prst="rect">
+            <a:avLst/>
+          </a:prstGeom>
+          <a:noFill/>
+        </p:spPr>
+        <p:txBody>
+          <a:bodyPr wrap="none" rtlCol="0">
+            <a:spAutoFit/>
+          </a:bodyPr>
+          <a:lstStyle/>
+          <a:p>
+            <a:r>
+              <a:rPr lang="en-US" dirty="0"/>
+              <a:t>Reso </a:t>
+            </a:r>
+          </a:p>
+          <a:p>
+            <a:r>
+              <a:rPr lang="en-US" dirty="0"/>
+              <a:t>Output</a:t>
+            </a:r>
+            <a:endParaRPr lang="en-DK" dirty="0"/>
+          </a:p>
+        </p:txBody>
+      </p:sp>
+    </p:spTree>
+    <p:extLst>
+      <p:ext uri="{BB962C8B-B14F-4D97-AF65-F5344CB8AC3E}">
+        <p14:creationId xmlns:p14="http://schemas.microsoft.com/office/powerpoint/2010/main" val="3173105583"/>
       </p:ext>
     </p:extLst>
   </p:cSld>

</xml_diff>